<commit_message>
Added a clean png for the white logo. Updated the presentation slides with the new logo.
</commit_message>
<xml_diff>
--- a/assets/other assets/FreeCodeCamp-slide-template.pptx
+++ b/assets/other assets/FreeCodeCamp-slide-template.pptx
@@ -1195,9 +1195,365 @@
           </a:p>
         </p:txBody>
       </p:sp>
+      <p:sp>
+        <p:nvSpPr>
+          <p:cNvPr id="11" name="Shape 11"/>
+          <p:cNvSpPr txBox="1"/>
+          <p:nvPr>
+            <p:ph type="title"/>
+          </p:nvPr>
+        </p:nvSpPr>
+        <p:spPr>
+          <a:xfrm>
+            <a:off x="0" y="913726"/>
+            <a:ext cx="9144000" cy="989699"/>
+          </a:xfrm>
+          <a:prstGeom prst="rect">
+            <a:avLst/>
+          </a:prstGeom>
+        </p:spPr>
+        <p:txBody>
+          <a:bodyPr anchorCtr="0" anchor="t" bIns="91425" lIns="91425" rIns="91425" tIns="91425"/>
+          <a:lstStyle>
+            <a:lvl1pPr lvl="0" rtl="0" algn="ctr">
+              <a:spcBef>
+                <a:spcPts val="0"/>
+              </a:spcBef>
+              <a:buNone/>
+              <a:defRPr b="1" sz="3600">
+                <a:solidFill>
+                  <a:schemeClr val="dk1"/>
+                </a:solidFill>
+                <a:latin typeface="Lato"/>
+                <a:ea typeface="Lato"/>
+                <a:cs typeface="Lato"/>
+                <a:sym typeface="Lato"/>
+              </a:defRPr>
+            </a:lvl1pPr>
+            <a:lvl2pPr lvl="1" rtl="0" algn="ctr">
+              <a:spcBef>
+                <a:spcPts val="0"/>
+              </a:spcBef>
+              <a:buNone/>
+              <a:defRPr sz="4800"/>
+            </a:lvl2pPr>
+            <a:lvl3pPr lvl="2" rtl="0" algn="ctr">
+              <a:spcBef>
+                <a:spcPts val="0"/>
+              </a:spcBef>
+              <a:buNone/>
+              <a:defRPr sz="4800"/>
+            </a:lvl3pPr>
+            <a:lvl4pPr lvl="3" rtl="0" algn="ctr">
+              <a:spcBef>
+                <a:spcPts val="0"/>
+              </a:spcBef>
+              <a:buNone/>
+              <a:defRPr sz="4800"/>
+            </a:lvl4pPr>
+            <a:lvl5pPr lvl="4" rtl="0" algn="ctr">
+              <a:spcBef>
+                <a:spcPts val="0"/>
+              </a:spcBef>
+              <a:buNone/>
+              <a:defRPr sz="4800"/>
+            </a:lvl5pPr>
+            <a:lvl6pPr lvl="5" rtl="0" algn="ctr">
+              <a:spcBef>
+                <a:spcPts val="0"/>
+              </a:spcBef>
+              <a:buNone/>
+              <a:defRPr sz="4800"/>
+            </a:lvl6pPr>
+            <a:lvl7pPr lvl="6" rtl="0" algn="ctr">
+              <a:spcBef>
+                <a:spcPts val="0"/>
+              </a:spcBef>
+              <a:buNone/>
+              <a:defRPr sz="4800"/>
+            </a:lvl7pPr>
+            <a:lvl8pPr lvl="7" rtl="0" algn="ctr">
+              <a:spcBef>
+                <a:spcPts val="0"/>
+              </a:spcBef>
+              <a:buNone/>
+              <a:defRPr sz="4800"/>
+            </a:lvl8pPr>
+            <a:lvl9pPr lvl="8" rtl="0" algn="ctr">
+              <a:spcBef>
+                <a:spcPts val="0"/>
+              </a:spcBef>
+              <a:buNone/>
+              <a:defRPr sz="4800"/>
+            </a:lvl9pPr>
+          </a:lstStyle>
+          <a:p/>
+        </p:txBody>
+      </p:sp>
+      <p:sp>
+        <p:nvSpPr>
+          <p:cNvPr id="12" name="Shape 12"/>
+          <p:cNvSpPr txBox="1"/>
+          <p:nvPr>
+            <p:ph idx="1" type="subTitle"/>
+          </p:nvPr>
+        </p:nvSpPr>
+        <p:spPr>
+          <a:xfrm>
+            <a:off x="879875" y="3943825"/>
+            <a:ext cx="3452700" cy="393600"/>
+          </a:xfrm>
+          <a:prstGeom prst="rect">
+            <a:avLst/>
+          </a:prstGeom>
+        </p:spPr>
+        <p:txBody>
+          <a:bodyPr anchorCtr="0" anchor="t" bIns="91425" lIns="91425" rIns="91425" tIns="91425"/>
+          <a:lstStyle>
+            <a:lvl1pPr lvl="0" rtl="0">
+              <a:spcBef>
+                <a:spcPts val="0"/>
+              </a:spcBef>
+              <a:buNone/>
+              <a:defRPr b="1" sz="1200"/>
+            </a:lvl1pPr>
+            <a:lvl2pPr lvl="1" rtl="0">
+              <a:spcBef>
+                <a:spcPts val="0"/>
+              </a:spcBef>
+              <a:buNone/>
+              <a:defRPr b="1" sz="1200"/>
+            </a:lvl2pPr>
+            <a:lvl3pPr lvl="2" rtl="0">
+              <a:spcBef>
+                <a:spcPts val="0"/>
+              </a:spcBef>
+              <a:buNone/>
+              <a:defRPr b="1" sz="1200"/>
+            </a:lvl3pPr>
+            <a:lvl4pPr lvl="3" rtl="0">
+              <a:spcBef>
+                <a:spcPts val="0"/>
+              </a:spcBef>
+              <a:buNone/>
+              <a:defRPr b="1" sz="1200"/>
+            </a:lvl4pPr>
+            <a:lvl5pPr lvl="4" rtl="0">
+              <a:spcBef>
+                <a:spcPts val="0"/>
+              </a:spcBef>
+              <a:buNone/>
+              <a:defRPr b="1" sz="1200"/>
+            </a:lvl5pPr>
+            <a:lvl6pPr lvl="5" rtl="0">
+              <a:spcBef>
+                <a:spcPts val="0"/>
+              </a:spcBef>
+              <a:buNone/>
+              <a:defRPr b="1" sz="1200"/>
+            </a:lvl6pPr>
+            <a:lvl7pPr lvl="6" rtl="0">
+              <a:spcBef>
+                <a:spcPts val="0"/>
+              </a:spcBef>
+              <a:buNone/>
+              <a:defRPr b="1" sz="1200"/>
+            </a:lvl7pPr>
+            <a:lvl8pPr lvl="7" rtl="0">
+              <a:spcBef>
+                <a:spcPts val="0"/>
+              </a:spcBef>
+              <a:buNone/>
+              <a:defRPr b="1" sz="1200"/>
+            </a:lvl8pPr>
+            <a:lvl9pPr lvl="8" rtl="0">
+              <a:spcBef>
+                <a:spcPts val="0"/>
+              </a:spcBef>
+              <a:buNone/>
+              <a:defRPr b="1" sz="1200"/>
+            </a:lvl9pPr>
+          </a:lstStyle>
+          <a:p/>
+        </p:txBody>
+      </p:sp>
+      <p:sp>
+        <p:nvSpPr>
+          <p:cNvPr id="13" name="Shape 13"/>
+          <p:cNvSpPr txBox="1"/>
+          <p:nvPr>
+            <p:ph idx="2" type="subTitle"/>
+          </p:nvPr>
+        </p:nvSpPr>
+        <p:spPr>
+          <a:xfrm>
+            <a:off x="879875" y="4129734"/>
+            <a:ext cx="3452700" cy="393600"/>
+          </a:xfrm>
+          <a:prstGeom prst="rect">
+            <a:avLst/>
+          </a:prstGeom>
+        </p:spPr>
+        <p:txBody>
+          <a:bodyPr anchorCtr="0" anchor="t" bIns="91425" lIns="91425" rIns="91425" tIns="91425"/>
+          <a:lstStyle>
+            <a:lvl1pPr lvl="0" rtl="0">
+              <a:spcBef>
+                <a:spcPts val="0"/>
+              </a:spcBef>
+              <a:buNone/>
+              <a:defRPr i="1" sz="1200"/>
+            </a:lvl1pPr>
+            <a:lvl2pPr lvl="1" rtl="0">
+              <a:spcBef>
+                <a:spcPts val="0"/>
+              </a:spcBef>
+              <a:buNone/>
+              <a:defRPr i="1" sz="1200"/>
+            </a:lvl2pPr>
+            <a:lvl3pPr lvl="2" rtl="0">
+              <a:spcBef>
+                <a:spcPts val="0"/>
+              </a:spcBef>
+              <a:buNone/>
+              <a:defRPr i="1" sz="1200"/>
+            </a:lvl3pPr>
+            <a:lvl4pPr lvl="3" rtl="0">
+              <a:spcBef>
+                <a:spcPts val="0"/>
+              </a:spcBef>
+              <a:buNone/>
+              <a:defRPr i="1" sz="1200"/>
+            </a:lvl4pPr>
+            <a:lvl5pPr lvl="4" rtl="0">
+              <a:spcBef>
+                <a:spcPts val="0"/>
+              </a:spcBef>
+              <a:buNone/>
+              <a:defRPr i="1" sz="1200"/>
+            </a:lvl5pPr>
+            <a:lvl6pPr lvl="5" rtl="0">
+              <a:spcBef>
+                <a:spcPts val="0"/>
+              </a:spcBef>
+              <a:buNone/>
+              <a:defRPr i="1" sz="1200"/>
+            </a:lvl6pPr>
+            <a:lvl7pPr lvl="6" rtl="0">
+              <a:spcBef>
+                <a:spcPts val="0"/>
+              </a:spcBef>
+              <a:buNone/>
+              <a:defRPr i="1" sz="1200"/>
+            </a:lvl7pPr>
+            <a:lvl8pPr lvl="7" rtl="0">
+              <a:spcBef>
+                <a:spcPts val="0"/>
+              </a:spcBef>
+              <a:buNone/>
+              <a:defRPr i="1" sz="1200"/>
+            </a:lvl8pPr>
+            <a:lvl9pPr lvl="8" rtl="0">
+              <a:spcBef>
+                <a:spcPts val="0"/>
+              </a:spcBef>
+              <a:buNone/>
+              <a:defRPr i="1" sz="1200"/>
+            </a:lvl9pPr>
+          </a:lstStyle>
+          <a:p/>
+        </p:txBody>
+      </p:sp>
+      <p:sp>
+        <p:nvSpPr>
+          <p:cNvPr id="14" name="Shape 14"/>
+          <p:cNvSpPr txBox="1"/>
+          <p:nvPr>
+            <p:ph idx="3" type="subTitle"/>
+          </p:nvPr>
+        </p:nvSpPr>
+        <p:spPr>
+          <a:xfrm>
+            <a:off x="1535400" y="1899950"/>
+            <a:ext cx="6073200" cy="342000"/>
+          </a:xfrm>
+          <a:prstGeom prst="rect">
+            <a:avLst/>
+          </a:prstGeom>
+        </p:spPr>
+        <p:txBody>
+          <a:bodyPr anchorCtr="0" anchor="t" bIns="91425" lIns="91425" rIns="91425" tIns="91425"/>
+          <a:lstStyle>
+            <a:lvl1pPr lvl="0" rtl="0" algn="ctr">
+              <a:spcBef>
+                <a:spcPts val="0"/>
+              </a:spcBef>
+              <a:buNone/>
+              <a:defRPr i="1" sz="2400"/>
+            </a:lvl1pPr>
+            <a:lvl2pPr lvl="1" rtl="0">
+              <a:spcBef>
+                <a:spcPts val="0"/>
+              </a:spcBef>
+              <a:buNone/>
+              <a:defRPr/>
+            </a:lvl2pPr>
+            <a:lvl3pPr lvl="2" rtl="0">
+              <a:spcBef>
+                <a:spcPts val="0"/>
+              </a:spcBef>
+              <a:buNone/>
+              <a:defRPr/>
+            </a:lvl3pPr>
+            <a:lvl4pPr lvl="3" rtl="0">
+              <a:spcBef>
+                <a:spcPts val="0"/>
+              </a:spcBef>
+              <a:buNone/>
+              <a:defRPr/>
+            </a:lvl4pPr>
+            <a:lvl5pPr lvl="4" rtl="0">
+              <a:spcBef>
+                <a:spcPts val="0"/>
+              </a:spcBef>
+              <a:buNone/>
+              <a:defRPr/>
+            </a:lvl5pPr>
+            <a:lvl6pPr lvl="5" rtl="0">
+              <a:spcBef>
+                <a:spcPts val="0"/>
+              </a:spcBef>
+              <a:buNone/>
+              <a:defRPr/>
+            </a:lvl6pPr>
+            <a:lvl7pPr lvl="6" rtl="0">
+              <a:spcBef>
+                <a:spcPts val="0"/>
+              </a:spcBef>
+              <a:buNone/>
+              <a:defRPr/>
+            </a:lvl7pPr>
+            <a:lvl8pPr lvl="7" rtl="0">
+              <a:spcBef>
+                <a:spcPts val="0"/>
+              </a:spcBef>
+              <a:buNone/>
+              <a:defRPr/>
+            </a:lvl8pPr>
+            <a:lvl9pPr lvl="8" rtl="0">
+              <a:spcBef>
+                <a:spcPts val="0"/>
+              </a:spcBef>
+              <a:buNone/>
+              <a:defRPr/>
+            </a:lvl9pPr>
+          </a:lstStyle>
+          <a:p/>
+        </p:txBody>
+      </p:sp>
       <p:pic>
         <p:nvPicPr>
-          <p:cNvPr descr="600x72 Free Code Camp logo for Medium publication.png" id="11" name="Shape 11"/>
+          <p:cNvPr descr="FCC-logo-white.png" id="15" name="Shape 15"/>
           <p:cNvPicPr preferRelativeResize="0"/>
           <p:nvPr/>
         </p:nvPicPr>
@@ -1211,8 +1567,8 @@
         </p:blipFill>
         <p:spPr>
           <a:xfrm>
-            <a:off x="3129762" y="4072483"/>
-            <a:ext cx="2848975" cy="341875"/>
+            <a:off x="3273281" y="4072475"/>
+            <a:ext cx="2536594" cy="341875"/>
           </a:xfrm>
           <a:prstGeom prst="rect">
             <a:avLst/>
@@ -1223,362 +1579,6 @@
           </a:ln>
         </p:spPr>
       </p:pic>
-      <p:sp>
-        <p:nvSpPr>
-          <p:cNvPr id="12" name="Shape 12"/>
-          <p:cNvSpPr txBox="1"/>
-          <p:nvPr>
-            <p:ph type="title"/>
-          </p:nvPr>
-        </p:nvSpPr>
-        <p:spPr>
-          <a:xfrm>
-            <a:off x="0" y="913726"/>
-            <a:ext cx="9144000" cy="989699"/>
-          </a:xfrm>
-          <a:prstGeom prst="rect">
-            <a:avLst/>
-          </a:prstGeom>
-        </p:spPr>
-        <p:txBody>
-          <a:bodyPr anchorCtr="0" anchor="t" bIns="91425" lIns="91425" rIns="91425" tIns="91425"/>
-          <a:lstStyle>
-            <a:lvl1pPr lvl="0" rtl="0" algn="ctr">
-              <a:spcBef>
-                <a:spcPts val="0"/>
-              </a:spcBef>
-              <a:buNone/>
-              <a:defRPr b="1" sz="3600">
-                <a:solidFill>
-                  <a:schemeClr val="dk1"/>
-                </a:solidFill>
-                <a:latin typeface="Lato"/>
-                <a:ea typeface="Lato"/>
-                <a:cs typeface="Lato"/>
-                <a:sym typeface="Lato"/>
-              </a:defRPr>
-            </a:lvl1pPr>
-            <a:lvl2pPr lvl="1" rtl="0" algn="ctr">
-              <a:spcBef>
-                <a:spcPts val="0"/>
-              </a:spcBef>
-              <a:buNone/>
-              <a:defRPr sz="4800"/>
-            </a:lvl2pPr>
-            <a:lvl3pPr lvl="2" rtl="0" algn="ctr">
-              <a:spcBef>
-                <a:spcPts val="0"/>
-              </a:spcBef>
-              <a:buNone/>
-              <a:defRPr sz="4800"/>
-            </a:lvl3pPr>
-            <a:lvl4pPr lvl="3" rtl="0" algn="ctr">
-              <a:spcBef>
-                <a:spcPts val="0"/>
-              </a:spcBef>
-              <a:buNone/>
-              <a:defRPr sz="4800"/>
-            </a:lvl4pPr>
-            <a:lvl5pPr lvl="4" rtl="0" algn="ctr">
-              <a:spcBef>
-                <a:spcPts val="0"/>
-              </a:spcBef>
-              <a:buNone/>
-              <a:defRPr sz="4800"/>
-            </a:lvl5pPr>
-            <a:lvl6pPr lvl="5" rtl="0" algn="ctr">
-              <a:spcBef>
-                <a:spcPts val="0"/>
-              </a:spcBef>
-              <a:buNone/>
-              <a:defRPr sz="4800"/>
-            </a:lvl6pPr>
-            <a:lvl7pPr lvl="6" rtl="0" algn="ctr">
-              <a:spcBef>
-                <a:spcPts val="0"/>
-              </a:spcBef>
-              <a:buNone/>
-              <a:defRPr sz="4800"/>
-            </a:lvl7pPr>
-            <a:lvl8pPr lvl="7" rtl="0" algn="ctr">
-              <a:spcBef>
-                <a:spcPts val="0"/>
-              </a:spcBef>
-              <a:buNone/>
-              <a:defRPr sz="4800"/>
-            </a:lvl8pPr>
-            <a:lvl9pPr lvl="8" rtl="0" algn="ctr">
-              <a:spcBef>
-                <a:spcPts val="0"/>
-              </a:spcBef>
-              <a:buNone/>
-              <a:defRPr sz="4800"/>
-            </a:lvl9pPr>
-          </a:lstStyle>
-          <a:p/>
-        </p:txBody>
-      </p:sp>
-      <p:sp>
-        <p:nvSpPr>
-          <p:cNvPr id="13" name="Shape 13"/>
-          <p:cNvSpPr txBox="1"/>
-          <p:nvPr>
-            <p:ph idx="1" type="subTitle"/>
-          </p:nvPr>
-        </p:nvSpPr>
-        <p:spPr>
-          <a:xfrm>
-            <a:off x="879875" y="3943825"/>
-            <a:ext cx="3452700" cy="393600"/>
-          </a:xfrm>
-          <a:prstGeom prst="rect">
-            <a:avLst/>
-          </a:prstGeom>
-        </p:spPr>
-        <p:txBody>
-          <a:bodyPr anchorCtr="0" anchor="t" bIns="91425" lIns="91425" rIns="91425" tIns="91425"/>
-          <a:lstStyle>
-            <a:lvl1pPr lvl="0" rtl="0">
-              <a:spcBef>
-                <a:spcPts val="0"/>
-              </a:spcBef>
-              <a:buNone/>
-              <a:defRPr b="1" sz="1200"/>
-            </a:lvl1pPr>
-            <a:lvl2pPr lvl="1" rtl="0">
-              <a:spcBef>
-                <a:spcPts val="0"/>
-              </a:spcBef>
-              <a:buNone/>
-              <a:defRPr b="1" sz="1200"/>
-            </a:lvl2pPr>
-            <a:lvl3pPr lvl="2" rtl="0">
-              <a:spcBef>
-                <a:spcPts val="0"/>
-              </a:spcBef>
-              <a:buNone/>
-              <a:defRPr b="1" sz="1200"/>
-            </a:lvl3pPr>
-            <a:lvl4pPr lvl="3" rtl="0">
-              <a:spcBef>
-                <a:spcPts val="0"/>
-              </a:spcBef>
-              <a:buNone/>
-              <a:defRPr b="1" sz="1200"/>
-            </a:lvl4pPr>
-            <a:lvl5pPr lvl="4" rtl="0">
-              <a:spcBef>
-                <a:spcPts val="0"/>
-              </a:spcBef>
-              <a:buNone/>
-              <a:defRPr b="1" sz="1200"/>
-            </a:lvl5pPr>
-            <a:lvl6pPr lvl="5" rtl="0">
-              <a:spcBef>
-                <a:spcPts val="0"/>
-              </a:spcBef>
-              <a:buNone/>
-              <a:defRPr b="1" sz="1200"/>
-            </a:lvl6pPr>
-            <a:lvl7pPr lvl="6" rtl="0">
-              <a:spcBef>
-                <a:spcPts val="0"/>
-              </a:spcBef>
-              <a:buNone/>
-              <a:defRPr b="1" sz="1200"/>
-            </a:lvl7pPr>
-            <a:lvl8pPr lvl="7" rtl="0">
-              <a:spcBef>
-                <a:spcPts val="0"/>
-              </a:spcBef>
-              <a:buNone/>
-              <a:defRPr b="1" sz="1200"/>
-            </a:lvl8pPr>
-            <a:lvl9pPr lvl="8" rtl="0">
-              <a:spcBef>
-                <a:spcPts val="0"/>
-              </a:spcBef>
-              <a:buNone/>
-              <a:defRPr b="1" sz="1200"/>
-            </a:lvl9pPr>
-          </a:lstStyle>
-          <a:p/>
-        </p:txBody>
-      </p:sp>
-      <p:sp>
-        <p:nvSpPr>
-          <p:cNvPr id="14" name="Shape 14"/>
-          <p:cNvSpPr txBox="1"/>
-          <p:nvPr>
-            <p:ph idx="2" type="subTitle"/>
-          </p:nvPr>
-        </p:nvSpPr>
-        <p:spPr>
-          <a:xfrm>
-            <a:off x="879875" y="4129734"/>
-            <a:ext cx="3452700" cy="393600"/>
-          </a:xfrm>
-          <a:prstGeom prst="rect">
-            <a:avLst/>
-          </a:prstGeom>
-        </p:spPr>
-        <p:txBody>
-          <a:bodyPr anchorCtr="0" anchor="t" bIns="91425" lIns="91425" rIns="91425" tIns="91425"/>
-          <a:lstStyle>
-            <a:lvl1pPr lvl="0" rtl="0">
-              <a:spcBef>
-                <a:spcPts val="0"/>
-              </a:spcBef>
-              <a:buNone/>
-              <a:defRPr i="1" sz="1200"/>
-            </a:lvl1pPr>
-            <a:lvl2pPr lvl="1" rtl="0">
-              <a:spcBef>
-                <a:spcPts val="0"/>
-              </a:spcBef>
-              <a:buNone/>
-              <a:defRPr i="1" sz="1200"/>
-            </a:lvl2pPr>
-            <a:lvl3pPr lvl="2" rtl="0">
-              <a:spcBef>
-                <a:spcPts val="0"/>
-              </a:spcBef>
-              <a:buNone/>
-              <a:defRPr i="1" sz="1200"/>
-            </a:lvl3pPr>
-            <a:lvl4pPr lvl="3" rtl="0">
-              <a:spcBef>
-                <a:spcPts val="0"/>
-              </a:spcBef>
-              <a:buNone/>
-              <a:defRPr i="1" sz="1200"/>
-            </a:lvl4pPr>
-            <a:lvl5pPr lvl="4" rtl="0">
-              <a:spcBef>
-                <a:spcPts val="0"/>
-              </a:spcBef>
-              <a:buNone/>
-              <a:defRPr i="1" sz="1200"/>
-            </a:lvl5pPr>
-            <a:lvl6pPr lvl="5" rtl="0">
-              <a:spcBef>
-                <a:spcPts val="0"/>
-              </a:spcBef>
-              <a:buNone/>
-              <a:defRPr i="1" sz="1200"/>
-            </a:lvl6pPr>
-            <a:lvl7pPr lvl="6" rtl="0">
-              <a:spcBef>
-                <a:spcPts val="0"/>
-              </a:spcBef>
-              <a:buNone/>
-              <a:defRPr i="1" sz="1200"/>
-            </a:lvl7pPr>
-            <a:lvl8pPr lvl="7" rtl="0">
-              <a:spcBef>
-                <a:spcPts val="0"/>
-              </a:spcBef>
-              <a:buNone/>
-              <a:defRPr i="1" sz="1200"/>
-            </a:lvl8pPr>
-            <a:lvl9pPr lvl="8" rtl="0">
-              <a:spcBef>
-                <a:spcPts val="0"/>
-              </a:spcBef>
-              <a:buNone/>
-              <a:defRPr i="1" sz="1200"/>
-            </a:lvl9pPr>
-          </a:lstStyle>
-          <a:p/>
-        </p:txBody>
-      </p:sp>
-      <p:sp>
-        <p:nvSpPr>
-          <p:cNvPr id="15" name="Shape 15"/>
-          <p:cNvSpPr txBox="1"/>
-          <p:nvPr>
-            <p:ph idx="3" type="subTitle"/>
-          </p:nvPr>
-        </p:nvSpPr>
-        <p:spPr>
-          <a:xfrm>
-            <a:off x="1535400" y="1899950"/>
-            <a:ext cx="6073200" cy="342000"/>
-          </a:xfrm>
-          <a:prstGeom prst="rect">
-            <a:avLst/>
-          </a:prstGeom>
-        </p:spPr>
-        <p:txBody>
-          <a:bodyPr anchorCtr="0" anchor="t" bIns="91425" lIns="91425" rIns="91425" tIns="91425"/>
-          <a:lstStyle>
-            <a:lvl1pPr lvl="0" rtl="0" algn="ctr">
-              <a:spcBef>
-                <a:spcPts val="0"/>
-              </a:spcBef>
-              <a:buNone/>
-              <a:defRPr i="1" sz="2400"/>
-            </a:lvl1pPr>
-            <a:lvl2pPr lvl="1" rtl="0">
-              <a:spcBef>
-                <a:spcPts val="0"/>
-              </a:spcBef>
-              <a:buNone/>
-              <a:defRPr/>
-            </a:lvl2pPr>
-            <a:lvl3pPr lvl="2" rtl="0">
-              <a:spcBef>
-                <a:spcPts val="0"/>
-              </a:spcBef>
-              <a:buNone/>
-              <a:defRPr/>
-            </a:lvl3pPr>
-            <a:lvl4pPr lvl="3" rtl="0">
-              <a:spcBef>
-                <a:spcPts val="0"/>
-              </a:spcBef>
-              <a:buNone/>
-              <a:defRPr/>
-            </a:lvl4pPr>
-            <a:lvl5pPr lvl="4" rtl="0">
-              <a:spcBef>
-                <a:spcPts val="0"/>
-              </a:spcBef>
-              <a:buNone/>
-              <a:defRPr/>
-            </a:lvl5pPr>
-            <a:lvl6pPr lvl="5" rtl="0">
-              <a:spcBef>
-                <a:spcPts val="0"/>
-              </a:spcBef>
-              <a:buNone/>
-              <a:defRPr/>
-            </a:lvl6pPr>
-            <a:lvl7pPr lvl="6" rtl="0">
-              <a:spcBef>
-                <a:spcPts val="0"/>
-              </a:spcBef>
-              <a:buNone/>
-              <a:defRPr/>
-            </a:lvl7pPr>
-            <a:lvl8pPr lvl="7" rtl="0">
-              <a:spcBef>
-                <a:spcPts val="0"/>
-              </a:spcBef>
-              <a:buNone/>
-              <a:defRPr/>
-            </a:lvl8pPr>
-            <a:lvl9pPr lvl="8" rtl="0">
-              <a:spcBef>
-                <a:spcPts val="0"/>
-              </a:spcBef>
-              <a:buNone/>
-              <a:defRPr/>
-            </a:lvl9pPr>
-          </a:lstStyle>
-          <a:p/>
-        </p:txBody>
-      </p:sp>
     </p:spTree>
   </p:cSld>
   <p:clrMapOvr>

</xml_diff>